<commit_message>
fixed some typos in presentation
</commit_message>
<xml_diff>
--- a/DesignPatterns.pptx
+++ b/DesignPatterns.pptx
@@ -4,6 +4,9 @@
   <p:sldMasterIdLst>
     <p:sldMasterId id="2147483648" r:id="rId1"/>
   </p:sldMasterIdLst>
+  <p:handoutMasterIdLst>
+    <p:handoutMasterId r:id="rId24"/>
+  </p:handoutMasterIdLst>
   <p:sldIdLst>
     <p:sldId id="256" r:id="rId2"/>
     <p:sldId id="257" r:id="rId3"/>
@@ -29,7 +32,7 @@
     <p:sldId id="278" r:id="rId23"/>
   </p:sldIdLst>
   <p:sldSz cx="9144000" cy="6858000" type="screen4x3"/>
-  <p:notesSz cx="6858000" cy="9144000"/>
+  <p:notesSz cx="9144000" cy="6858000"/>
   <p:defaultTextStyle>
     <a:defPPr>
       <a:defRPr lang="en-US"/>
@@ -126,6 +129,171 @@
     </a:lvl9pPr>
   </p:defaultTextStyle>
 </p:presentation>
+</file>
+
+<file path=ppt/handoutMasters/handoutMaster1.xml><?xml version="1.0" encoding="utf-8"?>
+<p:handoutMaster xmlns:a="http://schemas.openxmlformats.org/drawingml/2006/main" xmlns:r="http://schemas.openxmlformats.org/officeDocument/2006/relationships" xmlns:p="http://schemas.openxmlformats.org/presentationml/2006/main">
+  <p:cSld>
+    <p:bg>
+      <p:bgRef idx="1001">
+        <a:schemeClr val="bg1"/>
+      </p:bgRef>
+    </p:bg>
+    <p:spTree>
+      <p:nvGrpSpPr>
+        <p:cNvPr id="1" name=""/>
+        <p:cNvGrpSpPr/>
+        <p:nvPr/>
+      </p:nvGrpSpPr>
+      <p:grpSpPr>
+        <a:xfrm>
+          <a:off x="0" y="0"/>
+          <a:ext cx="0" cy="0"/>
+          <a:chOff x="0" y="0"/>
+          <a:chExt cx="0" cy="0"/>
+        </a:xfrm>
+      </p:grpSpPr>
+      <p:sp>
+        <p:nvSpPr>
+          <p:cNvPr id="2" name="Header Placeholder 1"/>
+          <p:cNvSpPr>
+            <a:spLocks noGrp="1"/>
+          </p:cNvSpPr>
+          <p:nvPr>
+            <p:ph type="hdr" sz="quarter"/>
+          </p:nvPr>
+        </p:nvSpPr>
+        <p:spPr>
+          <a:xfrm>
+            <a:off x="0" y="0"/>
+            <a:ext cx="3962400" cy="342900"/>
+          </a:xfrm>
+          <a:prstGeom prst="rect">
+            <a:avLst/>
+          </a:prstGeom>
+        </p:spPr>
+        <p:txBody>
+          <a:bodyPr vert="horz" lIns="91440" tIns="45720" rIns="91440" bIns="45720" rtlCol="0"/>
+          <a:lstStyle>
+            <a:lvl1pPr algn="l">
+              <a:defRPr sz="1200"/>
+            </a:lvl1pPr>
+          </a:lstStyle>
+          <a:p>
+            <a:endParaRPr lang="en-US"/>
+          </a:p>
+        </p:txBody>
+      </p:sp>
+      <p:sp>
+        <p:nvSpPr>
+          <p:cNvPr id="3" name="Date Placeholder 2"/>
+          <p:cNvSpPr>
+            <a:spLocks noGrp="1"/>
+          </p:cNvSpPr>
+          <p:nvPr>
+            <p:ph type="dt" sz="quarter" idx="1"/>
+          </p:nvPr>
+        </p:nvSpPr>
+        <p:spPr>
+          <a:xfrm>
+            <a:off x="5179484" y="0"/>
+            <a:ext cx="3962400" cy="342900"/>
+          </a:xfrm>
+          <a:prstGeom prst="rect">
+            <a:avLst/>
+          </a:prstGeom>
+        </p:spPr>
+        <p:txBody>
+          <a:bodyPr vert="horz" lIns="91440" tIns="45720" rIns="91440" bIns="45720" rtlCol="0"/>
+          <a:lstStyle>
+            <a:lvl1pPr algn="r">
+              <a:defRPr sz="1200"/>
+            </a:lvl1pPr>
+          </a:lstStyle>
+          <a:p>
+            <a:fld id="{DBEF4DFD-4C3D-C84F-AFEA-50B368087103}" type="datetimeFigureOut">
+              <a:rPr lang="en-US" smtClean="0"/>
+              <a:t>10/24/12</a:t>
+            </a:fld>
+            <a:endParaRPr lang="en-US"/>
+          </a:p>
+        </p:txBody>
+      </p:sp>
+      <p:sp>
+        <p:nvSpPr>
+          <p:cNvPr id="4" name="Footer Placeholder 3"/>
+          <p:cNvSpPr>
+            <a:spLocks noGrp="1"/>
+          </p:cNvSpPr>
+          <p:nvPr>
+            <p:ph type="ftr" sz="quarter" idx="2"/>
+          </p:nvPr>
+        </p:nvSpPr>
+        <p:spPr>
+          <a:xfrm>
+            <a:off x="0" y="6513910"/>
+            <a:ext cx="3962400" cy="342900"/>
+          </a:xfrm>
+          <a:prstGeom prst="rect">
+            <a:avLst/>
+          </a:prstGeom>
+        </p:spPr>
+        <p:txBody>
+          <a:bodyPr vert="horz" lIns="91440" tIns="45720" rIns="91440" bIns="45720" rtlCol="0" anchor="b"/>
+          <a:lstStyle>
+            <a:lvl1pPr algn="l">
+              <a:defRPr sz="1200"/>
+            </a:lvl1pPr>
+          </a:lstStyle>
+          <a:p>
+            <a:endParaRPr lang="en-US"/>
+          </a:p>
+        </p:txBody>
+      </p:sp>
+      <p:sp>
+        <p:nvSpPr>
+          <p:cNvPr id="5" name="Slide Number Placeholder 4"/>
+          <p:cNvSpPr>
+            <a:spLocks noGrp="1"/>
+          </p:cNvSpPr>
+          <p:nvPr>
+            <p:ph type="sldNum" sz="quarter" idx="3"/>
+          </p:nvPr>
+        </p:nvSpPr>
+        <p:spPr>
+          <a:xfrm>
+            <a:off x="5179484" y="6513910"/>
+            <a:ext cx="3962400" cy="342900"/>
+          </a:xfrm>
+          <a:prstGeom prst="rect">
+            <a:avLst/>
+          </a:prstGeom>
+        </p:spPr>
+        <p:txBody>
+          <a:bodyPr vert="horz" lIns="91440" tIns="45720" rIns="91440" bIns="45720" rtlCol="0" anchor="b"/>
+          <a:lstStyle>
+            <a:lvl1pPr algn="r">
+              <a:defRPr sz="1200"/>
+            </a:lvl1pPr>
+          </a:lstStyle>
+          <a:p>
+            <a:fld id="{615779CF-6122-3C4C-92B9-55F1B984C072}" type="slidenum">
+              <a:rPr lang="en-US" smtClean="0"/>
+              <a:t>‹#›</a:t>
+            </a:fld>
+            <a:endParaRPr lang="en-US"/>
+          </a:p>
+        </p:txBody>
+      </p:sp>
+    </p:spTree>
+    <p:extLst>
+      <p:ext uri="{BB962C8B-B14F-4D97-AF65-F5344CB8AC3E}">
+        <p14:creationId xmlns:p14="http://schemas.microsoft.com/office/powerpoint/2010/main" val="515768945"/>
+      </p:ext>
+    </p:extLst>
+  </p:cSld>
+  <p:clrMap bg1="lt1" tx1="dk1" bg2="lt2" tx2="dk2" accent1="accent1" accent2="accent2" accent3="accent3" accent4="accent4" accent5="accent5" accent6="accent6" hlink="hlink" folHlink="folHlink"/>
+</p:handoutMaster>
 </file>
 
 <file path=ppt/slideLayouts/slideLayout1.xml><?xml version="1.0" encoding="utf-8"?>
@@ -3133,11 +3301,11 @@
           <a:p>
             <a:r>
               <a:rPr lang="en-US" dirty="0" smtClean="0"/>
-              <a:t>Design Patterns In Ruby and </a:t>
+              <a:t>Design Patterns </a:t>
             </a:r>
             <a:r>
               <a:rPr lang="en-US" dirty="0" smtClean="0"/>
-              <a:t>Rails</a:t>
+              <a:t>in Ruby</a:t>
             </a:r>
             <a:br>
               <a:rPr lang="en-US" dirty="0" smtClean="0"/>
@@ -6903,21 +7071,28 @@
                 <a:latin typeface="Consolas"/>
                 <a:cs typeface="Consolas"/>
               </a:rPr>
-              <a:t>	if request </a:t>
+              <a:t>	if </a:t>
             </a:r>
             <a:r>
               <a:rPr lang="en-US" sz="1000" dirty="0" err="1" smtClean="0">
                 <a:latin typeface="Consolas"/>
                 <a:cs typeface="Consolas"/>
               </a:rPr>
-              <a:t>instanceof</a:t>
+              <a:t>request.instance_of</a:t>
             </a:r>
             <a:r>
               <a:rPr lang="en-US" sz="1000" dirty="0" smtClean="0">
                 <a:latin typeface="Consolas"/>
                 <a:cs typeface="Consolas"/>
               </a:rPr>
-              <a:t> String</a:t>
+              <a:t>? </a:t>
+            </a:r>
+            <a:r>
+              <a:rPr lang="en-US" sz="1000" dirty="0" smtClean="0">
+                <a:latin typeface="Consolas"/>
+                <a:cs typeface="Consolas"/>
+              </a:rPr>
+              <a:t>String</a:t>
             </a:r>
           </a:p>
           <a:p>
@@ -7121,21 +7296,35 @@
                 <a:latin typeface="Consolas"/>
                 <a:cs typeface="Consolas"/>
               </a:rPr>
-              <a:t>		if request </a:t>
+              <a:t>		if </a:t>
             </a:r>
             <a:r>
               <a:rPr lang="en-US" sz="1000" dirty="0" err="1" smtClean="0">
                 <a:latin typeface="Consolas"/>
                 <a:cs typeface="Consolas"/>
               </a:rPr>
-              <a:t>instanceof</a:t>
+              <a:t>request.instance_of</a:t>
+            </a:r>
+            <a:r>
+              <a:rPr lang="en-US" sz="1000" dirty="0">
+                <a:latin typeface="Consolas"/>
+                <a:cs typeface="Consolas"/>
+              </a:rPr>
+              <a:t>?</a:t>
             </a:r>
             <a:r>
               <a:rPr lang="en-US" sz="1000" dirty="0" smtClean="0">
                 <a:latin typeface="Consolas"/>
                 <a:cs typeface="Consolas"/>
               </a:rPr>
-              <a:t> Double</a:t>
+              <a:t> </a:t>
+            </a:r>
+            <a:r>
+              <a:rPr lang="en-US" sz="1000" dirty="0" smtClean="0">
+                <a:latin typeface="Consolas"/>
+                <a:cs typeface="Consolas"/>
+              </a:rPr>
+              <a:t>Double</a:t>
             </a:r>
           </a:p>
           <a:p>
@@ -9832,14 +10021,21 @@
                 <a:latin typeface="Consolas"/>
                 <a:cs typeface="Consolas"/>
               </a:rPr>
-              <a:t>SlowedMovement</a:t>
-            </a:r>
-            <a:r>
-              <a:rPr lang="en-US" sz="1100" dirty="0" smtClean="0">
-                <a:latin typeface="Consolas"/>
-                <a:cs typeface="Consolas"/>
-              </a:rPr>
-              <a:t> &lt; Movement</a:t>
+              <a:t>SlowMovement</a:t>
+            </a:r>
+            <a:r>
+              <a:rPr lang="en-US" sz="1100" dirty="0" smtClean="0">
+                <a:latin typeface="Consolas"/>
+                <a:cs typeface="Consolas"/>
+              </a:rPr>
+              <a:t> </a:t>
+            </a:r>
+            <a:r>
+              <a:rPr lang="en-US" sz="1100" dirty="0" smtClean="0">
+                <a:latin typeface="Consolas"/>
+                <a:cs typeface="Consolas"/>
+              </a:rPr>
+              <a:t>&lt; Movement</a:t>
             </a:r>
           </a:p>
           <a:p>
@@ -10285,7 +10481,7 @@
                 <a:latin typeface="Consolas"/>
                 <a:cs typeface="Consolas"/>
               </a:rPr>
-              <a:t>SlowedMovement.new</a:t>
+              <a:t>SlowMovement.new</a:t>
             </a:r>
             <a:r>
               <a:rPr lang="en-US" sz="1100" dirty="0" smtClean="0">
@@ -12647,8 +12843,12 @@
               <a:buNone/>
             </a:pPr>
             <a:r>
+              <a:rPr lang="en-US" sz="2000" smtClean="0"/>
+              <a:t>Design Patterns </a:t>
+            </a:r>
+            <a:r>
               <a:rPr lang="en-US" sz="2000" dirty="0" smtClean="0"/>
-              <a:t>Design Patters Will Return!</a:t>
+              <a:t>Will Return!</a:t>
             </a:r>
             <a:endParaRPr lang="en-US" sz="2000" dirty="0"/>
           </a:p>
@@ -12724,7 +12924,15 @@
           <a:p>
             <a:r>
               <a:rPr lang="en-US" dirty="0" smtClean="0"/>
-              <a:t>Factory Method – “Define and interface for creating an object, but let subclasses decide which classes to instantiate” </a:t>
+              <a:t>Factory Method – “Define </a:t>
+            </a:r>
+            <a:r>
+              <a:rPr lang="en-US" dirty="0" smtClean="0"/>
+              <a:t>an </a:t>
+            </a:r>
+            <a:r>
+              <a:rPr lang="en-US" dirty="0" smtClean="0"/>
+              <a:t>interface for creating an object, but let subclasses decide which classes to instantiate” </a:t>
             </a:r>
             <a:r>
               <a:rPr lang="en-US" b="1" i="1" dirty="0" err="1" smtClean="0"/>
@@ -12742,11 +12950,15 @@
             </a:r>
             <a:r>
               <a:rPr lang="en-US" b="1" i="1" dirty="0" err="1" smtClean="0"/>
-              <a:t>Object.each</a:t>
+              <a:t>Enumerator.each</a:t>
             </a:r>
             <a:r>
               <a:rPr lang="en-US" dirty="0" smtClean="0"/>
-              <a:t> is an example.</a:t>
+              <a:t> </a:t>
+            </a:r>
+            <a:r>
+              <a:rPr lang="en-US" dirty="0" smtClean="0"/>
+              <a:t>is an example.</a:t>
             </a:r>
             <a:endParaRPr lang="en-US" dirty="0"/>
           </a:p>
@@ -13454,7 +13666,7 @@
           <a:p>
             <a:r>
               <a:rPr lang="en-US" dirty="0" smtClean="0"/>
-              <a:t>Adaptor</a:t>
+              <a:t>Adapter</a:t>
             </a:r>
             <a:endParaRPr lang="en-US" dirty="0"/>
           </a:p>
@@ -14906,7 +15118,7 @@
         <p:spPr>
           <a:xfrm>
             <a:off x="283029" y="4601029"/>
-            <a:ext cx="8527142" cy="923330"/>
+            <a:ext cx="8527142" cy="1200329"/>
           </a:xfrm>
           <a:prstGeom prst="rect">
             <a:avLst/>
@@ -14925,7 +15137,7 @@
             </a:pPr>
             <a:r>
               <a:rPr lang="en-US" dirty="0" smtClean="0"/>
-              <a:t>Pure – when you do not want to or cannot modify the existing class definition.</a:t>
+              <a:t>Pure – when you do not want to or cannot (for cultural reasons) modify the existing class definition.</a:t>
             </a:r>
           </a:p>
           <a:p>
@@ -14945,11 +15157,7 @@
             </a:pPr>
             <a:r>
               <a:rPr lang="en-US" dirty="0" smtClean="0"/>
-              <a:t>Extend – when the method exists but the output is not suitable for </a:t>
-            </a:r>
-            <a:r>
-              <a:rPr lang="en-US" smtClean="0"/>
-              <a:t>the client.</a:t>
+              <a:t>Extend – when the method exists but the output is not suitable for the client.</a:t>
             </a:r>
             <a:endParaRPr lang="en-US" dirty="0"/>
           </a:p>
@@ -16371,4 +16579,324 @@
   </a:objectDefaults>
   <a:extraClrSchemeLst/>
 </a:theme>
+</file>
+
+<file path=ppt/theme/theme2.xml><?xml version="1.0" encoding="utf-8"?>
+<a:theme xmlns:a="http://schemas.openxmlformats.org/drawingml/2006/main" name="Office Theme">
+  <a:themeElements>
+    <a:clrScheme name="Office">
+      <a:dk1>
+        <a:sysClr val="windowText" lastClr="000000"/>
+      </a:dk1>
+      <a:lt1>
+        <a:sysClr val="window" lastClr="FFFFFF"/>
+      </a:lt1>
+      <a:dk2>
+        <a:srgbClr val="1F497D"/>
+      </a:dk2>
+      <a:lt2>
+        <a:srgbClr val="EEECE1"/>
+      </a:lt2>
+      <a:accent1>
+        <a:srgbClr val="4F81BD"/>
+      </a:accent1>
+      <a:accent2>
+        <a:srgbClr val="C0504D"/>
+      </a:accent2>
+      <a:accent3>
+        <a:srgbClr val="9BBB59"/>
+      </a:accent3>
+      <a:accent4>
+        <a:srgbClr val="8064A2"/>
+      </a:accent4>
+      <a:accent5>
+        <a:srgbClr val="4BACC6"/>
+      </a:accent5>
+      <a:accent6>
+        <a:srgbClr val="F79646"/>
+      </a:accent6>
+      <a:hlink>
+        <a:srgbClr val="0000FF"/>
+      </a:hlink>
+      <a:folHlink>
+        <a:srgbClr val="800080"/>
+      </a:folHlink>
+    </a:clrScheme>
+    <a:fontScheme name="Office">
+      <a:majorFont>
+        <a:latin typeface="Calibri"/>
+        <a:ea typeface=""/>
+        <a:cs typeface=""/>
+        <a:font script="Jpan" typeface="ＭＳ Ｐゴシック"/>
+        <a:font script="Hang" typeface="맑은 고딕"/>
+        <a:font script="Hans" typeface="宋体"/>
+        <a:font script="Hant" typeface="新細明體"/>
+        <a:font script="Arab" typeface="Times New Roman"/>
+        <a:font script="Hebr" typeface="Times New Roman"/>
+        <a:font script="Thai" typeface="Angsana New"/>
+        <a:font script="Ethi" typeface="Nyala"/>
+        <a:font script="Beng" typeface="Vrinda"/>
+        <a:font script="Gujr" typeface="Shruti"/>
+        <a:font script="Khmr" typeface="MoolBoran"/>
+        <a:font script="Knda" typeface="Tunga"/>
+        <a:font script="Guru" typeface="Raavi"/>
+        <a:font script="Cans" typeface="Euphemia"/>
+        <a:font script="Cher" typeface="Plantagenet Cherokee"/>
+        <a:font script="Yiii" typeface="Microsoft Yi Baiti"/>
+        <a:font script="Tibt" typeface="Microsoft Himalaya"/>
+        <a:font script="Thaa" typeface="MV Boli"/>
+        <a:font script="Deva" typeface="Mangal"/>
+        <a:font script="Telu" typeface="Gautami"/>
+        <a:font script="Taml" typeface="Latha"/>
+        <a:font script="Syrc" typeface="Estrangelo Edessa"/>
+        <a:font script="Orya" typeface="Kalinga"/>
+        <a:font script="Mlym" typeface="Kartika"/>
+        <a:font script="Laoo" typeface="DokChampa"/>
+        <a:font script="Sinh" typeface="Iskoola Pota"/>
+        <a:font script="Mong" typeface="Mongolian Baiti"/>
+        <a:font script="Viet" typeface="Times New Roman"/>
+        <a:font script="Uigh" typeface="Microsoft Uighur"/>
+        <a:font script="Geor" typeface="Sylfaen"/>
+      </a:majorFont>
+      <a:minorFont>
+        <a:latin typeface="Calibri"/>
+        <a:ea typeface=""/>
+        <a:cs typeface=""/>
+        <a:font script="Jpan" typeface="ＭＳ Ｐゴシック"/>
+        <a:font script="Hang" typeface="맑은 고딕"/>
+        <a:font script="Hans" typeface="宋体"/>
+        <a:font script="Hant" typeface="新細明體"/>
+        <a:font script="Arab" typeface="Arial"/>
+        <a:font script="Hebr" typeface="Arial"/>
+        <a:font script="Thai" typeface="Cordia New"/>
+        <a:font script="Ethi" typeface="Nyala"/>
+        <a:font script="Beng" typeface="Vrinda"/>
+        <a:font script="Gujr" typeface="Shruti"/>
+        <a:font script="Khmr" typeface="DaunPenh"/>
+        <a:font script="Knda" typeface="Tunga"/>
+        <a:font script="Guru" typeface="Raavi"/>
+        <a:font script="Cans" typeface="Euphemia"/>
+        <a:font script="Cher" typeface="Plantagenet Cherokee"/>
+        <a:font script="Yiii" typeface="Microsoft Yi Baiti"/>
+        <a:font script="Tibt" typeface="Microsoft Himalaya"/>
+        <a:font script="Thaa" typeface="MV Boli"/>
+        <a:font script="Deva" typeface="Mangal"/>
+        <a:font script="Telu" typeface="Gautami"/>
+        <a:font script="Taml" typeface="Latha"/>
+        <a:font script="Syrc" typeface="Estrangelo Edessa"/>
+        <a:font script="Orya" typeface="Kalinga"/>
+        <a:font script="Mlym" typeface="Kartika"/>
+        <a:font script="Laoo" typeface="DokChampa"/>
+        <a:font script="Sinh" typeface="Iskoola Pota"/>
+        <a:font script="Mong" typeface="Mongolian Baiti"/>
+        <a:font script="Viet" typeface="Arial"/>
+        <a:font script="Uigh" typeface="Microsoft Uighur"/>
+        <a:font script="Geor" typeface="Sylfaen"/>
+      </a:minorFont>
+    </a:fontScheme>
+    <a:fmtScheme name="Office">
+      <a:fillStyleLst>
+        <a:solidFill>
+          <a:schemeClr val="phClr"/>
+        </a:solidFill>
+        <a:gradFill rotWithShape="1">
+          <a:gsLst>
+            <a:gs pos="0">
+              <a:schemeClr val="phClr">
+                <a:tint val="50000"/>
+                <a:satMod val="300000"/>
+              </a:schemeClr>
+            </a:gs>
+            <a:gs pos="35000">
+              <a:schemeClr val="phClr">
+                <a:tint val="37000"/>
+                <a:satMod val="300000"/>
+              </a:schemeClr>
+            </a:gs>
+            <a:gs pos="100000">
+              <a:schemeClr val="phClr">
+                <a:tint val="15000"/>
+                <a:satMod val="350000"/>
+              </a:schemeClr>
+            </a:gs>
+          </a:gsLst>
+          <a:lin ang="16200000" scaled="1"/>
+        </a:gradFill>
+        <a:gradFill rotWithShape="1">
+          <a:gsLst>
+            <a:gs pos="0">
+              <a:schemeClr val="phClr">
+                <a:tint val="100000"/>
+                <a:shade val="100000"/>
+                <a:satMod val="130000"/>
+              </a:schemeClr>
+            </a:gs>
+            <a:gs pos="100000">
+              <a:schemeClr val="phClr">
+                <a:tint val="50000"/>
+                <a:shade val="100000"/>
+                <a:satMod val="350000"/>
+              </a:schemeClr>
+            </a:gs>
+          </a:gsLst>
+          <a:lin ang="16200000" scaled="0"/>
+        </a:gradFill>
+      </a:fillStyleLst>
+      <a:lnStyleLst>
+        <a:ln w="9525" cap="flat" cmpd="sng" algn="ctr">
+          <a:solidFill>
+            <a:schemeClr val="phClr">
+              <a:shade val="95000"/>
+              <a:satMod val="105000"/>
+            </a:schemeClr>
+          </a:solidFill>
+          <a:prstDash val="solid"/>
+        </a:ln>
+        <a:ln w="25400" cap="flat" cmpd="sng" algn="ctr">
+          <a:solidFill>
+            <a:schemeClr val="phClr"/>
+          </a:solidFill>
+          <a:prstDash val="solid"/>
+        </a:ln>
+        <a:ln w="38100" cap="flat" cmpd="sng" algn="ctr">
+          <a:solidFill>
+            <a:schemeClr val="phClr"/>
+          </a:solidFill>
+          <a:prstDash val="solid"/>
+        </a:ln>
+      </a:lnStyleLst>
+      <a:effectStyleLst>
+        <a:effectStyle>
+          <a:effectLst>
+            <a:outerShdw blurRad="40000" dist="20000" dir="5400000" rotWithShape="0">
+              <a:srgbClr val="000000">
+                <a:alpha val="38000"/>
+              </a:srgbClr>
+            </a:outerShdw>
+          </a:effectLst>
+        </a:effectStyle>
+        <a:effectStyle>
+          <a:effectLst>
+            <a:outerShdw blurRad="40000" dist="23000" dir="5400000" rotWithShape="0">
+              <a:srgbClr val="000000">
+                <a:alpha val="35000"/>
+              </a:srgbClr>
+            </a:outerShdw>
+          </a:effectLst>
+        </a:effectStyle>
+        <a:effectStyle>
+          <a:effectLst>
+            <a:outerShdw blurRad="40000" dist="23000" dir="5400000" rotWithShape="0">
+              <a:srgbClr val="000000">
+                <a:alpha val="35000"/>
+              </a:srgbClr>
+            </a:outerShdw>
+          </a:effectLst>
+          <a:scene3d>
+            <a:camera prst="orthographicFront">
+              <a:rot lat="0" lon="0" rev="0"/>
+            </a:camera>
+            <a:lightRig rig="threePt" dir="t">
+              <a:rot lat="0" lon="0" rev="1200000"/>
+            </a:lightRig>
+          </a:scene3d>
+          <a:sp3d>
+            <a:bevelT w="63500" h="25400"/>
+          </a:sp3d>
+        </a:effectStyle>
+      </a:effectStyleLst>
+      <a:bgFillStyleLst>
+        <a:solidFill>
+          <a:schemeClr val="phClr"/>
+        </a:solidFill>
+        <a:gradFill rotWithShape="1">
+          <a:gsLst>
+            <a:gs pos="0">
+              <a:schemeClr val="phClr">
+                <a:tint val="40000"/>
+                <a:satMod val="350000"/>
+              </a:schemeClr>
+            </a:gs>
+            <a:gs pos="40000">
+              <a:schemeClr val="phClr">
+                <a:tint val="45000"/>
+                <a:shade val="99000"/>
+                <a:satMod val="350000"/>
+              </a:schemeClr>
+            </a:gs>
+            <a:gs pos="100000">
+              <a:schemeClr val="phClr">
+                <a:shade val="20000"/>
+                <a:satMod val="255000"/>
+              </a:schemeClr>
+            </a:gs>
+          </a:gsLst>
+          <a:path path="circle">
+            <a:fillToRect l="50000" t="-80000" r="50000" b="180000"/>
+          </a:path>
+        </a:gradFill>
+        <a:gradFill rotWithShape="1">
+          <a:gsLst>
+            <a:gs pos="0">
+              <a:schemeClr val="phClr">
+                <a:tint val="80000"/>
+                <a:satMod val="300000"/>
+              </a:schemeClr>
+            </a:gs>
+            <a:gs pos="100000">
+              <a:schemeClr val="phClr">
+                <a:shade val="30000"/>
+                <a:satMod val="200000"/>
+              </a:schemeClr>
+            </a:gs>
+          </a:gsLst>
+          <a:path path="circle">
+            <a:fillToRect l="50000" t="50000" r="50000" b="50000"/>
+          </a:path>
+        </a:gradFill>
+      </a:bgFillStyleLst>
+    </a:fmtScheme>
+  </a:themeElements>
+  <a:objectDefaults>
+    <a:spDef>
+      <a:spPr/>
+      <a:bodyPr/>
+      <a:lstStyle/>
+      <a:style>
+        <a:lnRef idx="1">
+          <a:schemeClr val="accent1"/>
+        </a:lnRef>
+        <a:fillRef idx="3">
+          <a:schemeClr val="accent1"/>
+        </a:fillRef>
+        <a:effectRef idx="2">
+          <a:schemeClr val="accent1"/>
+        </a:effectRef>
+        <a:fontRef idx="minor">
+          <a:schemeClr val="lt1"/>
+        </a:fontRef>
+      </a:style>
+    </a:spDef>
+    <a:lnDef>
+      <a:spPr/>
+      <a:bodyPr/>
+      <a:lstStyle/>
+      <a:style>
+        <a:lnRef idx="2">
+          <a:schemeClr val="accent1"/>
+        </a:lnRef>
+        <a:fillRef idx="0">
+          <a:schemeClr val="accent1"/>
+        </a:fillRef>
+        <a:effectRef idx="1">
+          <a:schemeClr val="accent1"/>
+        </a:effectRef>
+        <a:fontRef idx="minor">
+          <a:schemeClr val="tx1"/>
+        </a:fontRef>
+      </a:style>
+    </a:lnDef>
+  </a:objectDefaults>
+  <a:extraClrSchemeLst/>
+</a:theme>
 </file>
</xml_diff>